<commit_message>
Slide Changes and Code Map
</commit_message>
<xml_diff>
--- a/slides/UnitTesting.pptx
+++ b/slides/UnitTesting.pptx
@@ -141,6 +141,9 @@
   <p:extLst>
     <p:ext uri="{EFAFB233-063F-42B5-8137-9DF3F51BA10A}">
       <p15:sldGuideLst xmlns:p15="http://schemas.microsoft.com/office/powerpoint/2012/main"/>
+    </p:ext>
+    <p:ext uri="{2D200454-40CA-4A62-9FC3-DE9A4176ACB9}">
+      <p15:notesGuideLst xmlns:p15="http://schemas.microsoft.com/office/powerpoint/2012/main"/>
     </p:ext>
   </p:extLst>
 </p:presentation>
@@ -5274,6 +5277,12 @@
           <a:p>
             <a:r>
               <a:rPr lang="en-US" dirty="0"/>
+              <a:t>Refactoring </a:t>
+            </a:r>
+          </a:p>
+          <a:p>
+            <a:r>
+              <a:rPr lang="en-US" dirty="0"/>
               <a:t>Resources</a:t>
             </a:r>
           </a:p>
@@ -5682,21 +5691,35 @@
             <a:pPr lvl="1"/>
             <a:r>
               <a:rPr lang="en-US" dirty="0">
+                <a:highlight>
+                  <a:srgbClr val="FFFF00"/>
+                </a:highlight>
                 <a:hlinkClick r:id="rId2"/>
               </a:rPr>
               <a:t>https://github.com/AutoFixture/AutoFixture/wiki/cheat-sheet</a:t>
             </a:r>
-            <a:endParaRPr lang="en-US" dirty="0"/>
+            <a:endParaRPr lang="en-US" dirty="0">
+              <a:highlight>
+                <a:srgbClr val="FFFF00"/>
+              </a:highlight>
+            </a:endParaRPr>
           </a:p>
           <a:p>
             <a:pPr lvl="1"/>
             <a:r>
               <a:rPr lang="en-US" dirty="0">
+                <a:highlight>
+                  <a:srgbClr val="FFFF00"/>
+                </a:highlight>
                 <a:hlinkClick r:id="rId3"/>
               </a:rPr>
               <a:t>https://github.com/AutoFixture</a:t>
             </a:r>
-            <a:endParaRPr lang="en-US" dirty="0"/>
+            <a:endParaRPr lang="en-US" dirty="0">
+              <a:highlight>
+                <a:srgbClr val="FFFF00"/>
+              </a:highlight>
+            </a:endParaRPr>
           </a:p>
           <a:p>
             <a:endParaRPr lang="en-US" dirty="0"/>
@@ -6272,11 +6295,18 @@
               <a:buNone/>
             </a:pPr>
             <a:r>
-              <a:rPr lang="en-US" dirty="0"/>
+              <a:rPr lang="en-US" dirty="0">
+                <a:highlight>
+                  <a:srgbClr val="FFFF00"/>
+                </a:highlight>
+              </a:rPr>
               <a:t>	</a:t>
             </a:r>
             <a:r>
               <a:rPr lang="en-US" dirty="0">
+                <a:highlight>
+                  <a:srgbClr val="FFFF00"/>
+                </a:highlight>
                 <a:hlinkClick r:id="rId2"/>
               </a:rPr>
               <a:t>https://fluentassertions.com/</a:t>
@@ -6285,6 +6315,9 @@
               <a:solidFill>
                 <a:srgbClr val="FF0000"/>
               </a:solidFill>
+              <a:highlight>
+                <a:srgbClr val="FFFF00"/>
+              </a:highlight>
             </a:endParaRPr>
           </a:p>
         </p:txBody>
@@ -7046,11 +7079,11 @@
           <a:p>
             <a:r>
               <a:rPr lang="en-US" dirty="0"/>
-              <a:t>TDD Life Cycle Red, Green, Refactor(test and into </a:t>
-            </a:r>
-            <a:r>
-              <a:rPr lang="en-US"/>
-              <a:t>code base)</a:t>
+              <a:t>TDD Life Cycle Red, Green, Refactor</a:t>
+            </a:r>
+            <a:r>
+              <a:rPr lang="en-US" sz="2400" dirty="0"/>
+              <a:t>(write test and refactor into code base)</a:t>
             </a:r>
             <a:endParaRPr lang="en-US" dirty="0"/>
           </a:p>
@@ -7297,8 +7330,48 @@
           <a:p>
             <a:r>
               <a:rPr lang="en-US" dirty="0"/>
-              <a:t>Isolate Static Behavior  </a:t>
-            </a:r>
+              <a:t>Isolate Static Behavior</a:t>
+            </a:r>
+          </a:p>
+          <a:p>
+            <a:r>
+              <a:rPr lang="en-US" dirty="0">
+                <a:solidFill>
+                  <a:srgbClr val="0563C1"/>
+                </a:solidFill>
+                <a:highlight>
+                  <a:srgbClr val="FFFF00"/>
+                </a:highlight>
+                <a:hlinkClick r:id="rId2">
+                  <a:extLst>
+                    <a:ext uri="{A12FA001-AC4F-418D-AE19-62706E023703}">
+                      <ahyp:hlinkClr xmlns:ahyp="http://schemas.microsoft.com/office/drawing/2018/hyperlinkcolor" val="tx"/>
+                    </a:ext>
+                  </a:extLst>
+                </a:hlinkClick>
+              </a:rPr>
+              <a:t>Code Map</a:t>
+            </a:r>
+            <a:r>
+              <a:rPr lang="en-US" dirty="0">
+                <a:highlight>
+                  <a:srgbClr val="FFFF00"/>
+                </a:highlight>
+                <a:hlinkClick r:id="rId2">
+                  <a:extLst>
+                    <a:ext uri="{A12FA001-AC4F-418D-AE19-62706E023703}">
+                      <ahyp:hlinkClr xmlns:ahyp="http://schemas.microsoft.com/office/drawing/2018/hyperlinkcolor" val="tx"/>
+                    </a:ext>
+                  </a:extLst>
+                </a:hlinkClick>
+              </a:rPr>
+              <a:t>  </a:t>
+            </a:r>
+            <a:endParaRPr lang="en-US" dirty="0">
+              <a:highlight>
+                <a:srgbClr val="FFFF00"/>
+              </a:highlight>
+            </a:endParaRPr>
           </a:p>
         </p:txBody>
       </p:sp>
@@ -7402,6 +7475,9 @@
             <a:r>
               <a:rPr lang="en-US" sz="1800" dirty="0">
                 <a:effectLst/>
+                <a:highlight>
+                  <a:srgbClr val="FFFF00"/>
+                </a:highlight>
                 <a:latin typeface="Calibri" panose="020F0502020204030204" pitchFamily="34" charset="0"/>
                 <a:hlinkClick r:id="rId2"/>
               </a:rPr>
@@ -7409,6 +7485,9 @@
             </a:r>
             <a:endParaRPr lang="en-US" sz="1800" dirty="0">
               <a:effectLst/>
+              <a:highlight>
+                <a:srgbClr val="FFFF00"/>
+              </a:highlight>
               <a:latin typeface="Calibri" panose="020F0502020204030204" pitchFamily="34" charset="0"/>
             </a:endParaRPr>
           </a:p>
@@ -7424,6 +7503,9 @@
             <a:r>
               <a:rPr lang="en-US" sz="1800" dirty="0">
                 <a:effectLst/>
+                <a:highlight>
+                  <a:srgbClr val="FFFF00"/>
+                </a:highlight>
                 <a:latin typeface="Calibri" panose="020F0502020204030204" pitchFamily="34" charset="0"/>
               </a:rPr>
               <a:t> </a:t>
@@ -7441,6 +7523,9 @@
             <a:r>
               <a:rPr lang="en-US" sz="1800" dirty="0">
                 <a:effectLst/>
+                <a:highlight>
+                  <a:srgbClr val="FFFF00"/>
+                </a:highlight>
                 <a:latin typeface="Calibri" panose="020F0502020204030204" pitchFamily="34" charset="0"/>
                 <a:hlinkClick r:id="rId3"/>
               </a:rPr>
@@ -7448,6 +7533,9 @@
             </a:r>
             <a:endParaRPr lang="en-US" sz="1800" dirty="0">
               <a:effectLst/>
+              <a:highlight>
+                <a:srgbClr val="FFFF00"/>
+              </a:highlight>
               <a:latin typeface="Calibri" panose="020F0502020204030204" pitchFamily="34" charset="0"/>
             </a:endParaRPr>
           </a:p>
@@ -7463,6 +7551,9 @@
             <a:r>
               <a:rPr lang="en-US" sz="1800" dirty="0">
                 <a:effectLst/>
+                <a:highlight>
+                  <a:srgbClr val="FFFF00"/>
+                </a:highlight>
                 <a:latin typeface="Calibri" panose="020F0502020204030204" pitchFamily="34" charset="0"/>
               </a:rPr>
               <a:t> </a:t>
@@ -7480,6 +7571,9 @@
             <a:r>
               <a:rPr lang="en-US" sz="1800" dirty="0">
                 <a:effectLst/>
+                <a:highlight>
+                  <a:srgbClr val="FFFF00"/>
+                </a:highlight>
                 <a:latin typeface="Calibri" panose="020F0502020204030204" pitchFamily="34" charset="0"/>
                 <a:hlinkClick r:id="rId4"/>
               </a:rPr>
@@ -7487,6 +7581,9 @@
             </a:r>
             <a:endParaRPr lang="en-US" sz="1800" dirty="0">
               <a:effectLst/>
+              <a:highlight>
+                <a:srgbClr val="FFFF00"/>
+              </a:highlight>
               <a:latin typeface="Calibri" panose="020F0502020204030204" pitchFamily="34" charset="0"/>
             </a:endParaRPr>
           </a:p>
@@ -7502,6 +7599,9 @@
             <a:r>
               <a:rPr lang="en-US" sz="1800" dirty="0">
                 <a:effectLst/>
+                <a:highlight>
+                  <a:srgbClr val="FFFF00"/>
+                </a:highlight>
                 <a:latin typeface="Calibri" panose="020F0502020204030204" pitchFamily="34" charset="0"/>
               </a:rPr>
               <a:t> </a:t>
@@ -7519,6 +7619,9 @@
             <a:r>
               <a:rPr lang="en-US" sz="1800" dirty="0">
                 <a:effectLst/>
+                <a:highlight>
+                  <a:srgbClr val="FFFF00"/>
+                </a:highlight>
                 <a:latin typeface="Calibri" panose="020F0502020204030204" pitchFamily="34" charset="0"/>
                 <a:hlinkClick r:id="rId5"/>
               </a:rPr>
@@ -7526,6 +7629,9 @@
             </a:r>
             <a:endParaRPr lang="en-US" sz="1800" dirty="0">
               <a:effectLst/>
+              <a:highlight>
+                <a:srgbClr val="FFFF00"/>
+              </a:highlight>
               <a:latin typeface="Calibri" panose="020F0502020204030204" pitchFamily="34" charset="0"/>
             </a:endParaRPr>
           </a:p>
@@ -7541,6 +7647,9 @@
             <a:r>
               <a:rPr lang="en-US" sz="1800" dirty="0">
                 <a:effectLst/>
+                <a:highlight>
+                  <a:srgbClr val="FFFF00"/>
+                </a:highlight>
                 <a:latin typeface="Calibri" panose="020F0502020204030204" pitchFamily="34" charset="0"/>
               </a:rPr>
               <a:t> </a:t>
@@ -7558,6 +7667,9 @@
             <a:r>
               <a:rPr lang="en-US" sz="1800" dirty="0">
                 <a:effectLst/>
+                <a:highlight>
+                  <a:srgbClr val="FFFF00"/>
+                </a:highlight>
                 <a:latin typeface="Calibri" panose="020F0502020204030204" pitchFamily="34" charset="0"/>
                 <a:hlinkClick r:id="rId6"/>
               </a:rPr>
@@ -7565,6 +7677,9 @@
             </a:r>
             <a:endParaRPr lang="en-US" sz="1800" dirty="0">
               <a:effectLst/>
+              <a:highlight>
+                <a:srgbClr val="FFFF00"/>
+              </a:highlight>
               <a:latin typeface="Calibri" panose="020F0502020204030204" pitchFamily="34" charset="0"/>
             </a:endParaRPr>
           </a:p>
@@ -7580,6 +7695,9 @@
             <a:r>
               <a:rPr lang="en-US" sz="1800" dirty="0">
                 <a:effectLst/>
+                <a:highlight>
+                  <a:srgbClr val="FFFF00"/>
+                </a:highlight>
                 <a:latin typeface="Calibri" panose="020F0502020204030204" pitchFamily="34" charset="0"/>
               </a:rPr>
               <a:t> </a:t>
@@ -7596,6 +7714,9 @@
               <a:buNone/>
             </a:pPr>
             <a:endParaRPr lang="en-US" sz="1800" dirty="0">
+              <a:highlight>
+                <a:srgbClr val="FFFF00"/>
+              </a:highlight>
               <a:latin typeface="Calibri" panose="020F0502020204030204" pitchFamily="34" charset="0"/>
             </a:endParaRPr>
           </a:p>
@@ -7612,6 +7733,9 @@
             <a:r>
               <a:rPr lang="en-US" sz="1800" dirty="0">
                 <a:effectLst/>
+                <a:highlight>
+                  <a:srgbClr val="FFFF00"/>
+                </a:highlight>
                 <a:latin typeface="Calibri" panose="020F0502020204030204" pitchFamily="34" charset="0"/>
                 <a:hlinkClick r:id="rId7"/>
               </a:rPr>
@@ -7619,6 +7743,9 @@
             </a:r>
             <a:endParaRPr lang="en-US" sz="1800" dirty="0">
               <a:effectLst/>
+              <a:highlight>
+                <a:srgbClr val="FFFF00"/>
+              </a:highlight>
               <a:latin typeface="Calibri" panose="020F0502020204030204" pitchFamily="34" charset="0"/>
             </a:endParaRPr>
           </a:p>
@@ -7793,12 +7920,19 @@
             <a:r>
               <a:rPr lang="en-US" sz="1800" dirty="0">
                 <a:effectLst/>
+                <a:highlight>
+                  <a:srgbClr val="FFFF00"/>
+                </a:highlight>
                 <a:latin typeface="Calibri" panose="020F0502020204030204" pitchFamily="34" charset="0"/>
                 <a:hlinkClick r:id="rId2"/>
               </a:rPr>
               <a:t>https://martinfowler.com/bliki/UnitTest.html</a:t>
             </a:r>
-            <a:endParaRPr lang="en-US" dirty="0"/>
+            <a:endParaRPr lang="en-US" dirty="0">
+              <a:highlight>
+                <a:srgbClr val="FFFF00"/>
+              </a:highlight>
+            </a:endParaRPr>
           </a:p>
           <a:p>
             <a:endParaRPr lang="en-US" dirty="0"/>
@@ -7924,7 +8058,7 @@
           <a:p>
             <a:r>
               <a:rPr lang="en-US" dirty="0"/>
-              <a:t>Easier to test all logical paths</a:t>
+              <a:t>Easier to test all logical paths or branches </a:t>
             </a:r>
           </a:p>
           <a:p>
@@ -8147,6 +8281,9 @@
             <a:r>
               <a:rPr lang="en-US" sz="1800" dirty="0">
                 <a:effectLst/>
+                <a:highlight>
+                  <a:srgbClr val="FFFF00"/>
+                </a:highlight>
                 <a:latin typeface="Calibri" panose="020F0502020204030204" pitchFamily="34" charset="0"/>
                 <a:hlinkClick r:id="rId2"/>
               </a:rPr>
@@ -8154,6 +8291,9 @@
             </a:r>
             <a:endParaRPr lang="en-US" sz="1800" dirty="0">
               <a:effectLst/>
+              <a:highlight>
+                <a:srgbClr val="FFFF00"/>
+              </a:highlight>
               <a:latin typeface="Calibri" panose="020F0502020204030204" pitchFamily="34" charset="0"/>
             </a:endParaRPr>
           </a:p>

</xml_diff>